<commit_message>
submitting updated PPT slides
</commit_message>
<xml_diff>
--- a/Project 1 PPT Slides.pptx
+++ b/Project 1 PPT Slides.pptx
@@ -528,7 +528,7 @@
           <a:p>
             <a:r>
               <a:rPr lang="en-US" dirty="0"/>
-              <a:t>NexGen</a:t>
+              <a:t>Team NexGen</a:t>
             </a:r>
           </a:p>
         </p:txBody>
@@ -6583,7 +6583,7 @@
         </p:spPr>
         <p:txBody>
           <a:bodyPr>
-            <a:normAutofit fontScale="25000" lnSpcReduction="20000"/>
+            <a:normAutofit fontScale="32500" lnSpcReduction="20000"/>
           </a:bodyPr>
           <a:lstStyle/>
           <a:p>
@@ -6677,26 +6677,6 @@
               <a:t>2.27</a:t>
             </a:r>
             <a:endParaRPr lang="en-US" sz="2400" dirty="0"/>
-          </a:p>
-          <a:p>
-            <a:r>
-              <a:rPr lang="en-US" sz="4400" dirty="0"/>
-              <a:t>Summary</a:t>
-            </a:r>
-          </a:p>
-          <a:p>
-            <a:pPr lvl="1"/>
-            <a:r>
-              <a:rPr lang="en-US" sz="4400" dirty="0"/>
-              <a:t>Comparing the 3 years, the CPI (inflation) is increasing which results in lower interest rate and lower sales revenue.  </a:t>
-            </a:r>
-          </a:p>
-          <a:p>
-            <a:pPr lvl="1"/>
-            <a:r>
-              <a:rPr lang="en-US" sz="4400" dirty="0"/>
-              <a:t>Thus, CPI and interest rate / sales revenue are inversely proportional.</a:t>
-            </a:r>
           </a:p>
           <a:p>
             <a:pPr lvl="1"/>
@@ -6726,8 +6706,8 @@
         </p:blipFill>
         <p:spPr>
           <a:xfrm>
-            <a:off x="2782614" y="2610748"/>
-            <a:ext cx="4921981" cy="1968792"/>
+            <a:off x="3635009" y="3205828"/>
+            <a:ext cx="7306284" cy="2922513"/>
           </a:xfrm>
           <a:prstGeom prst="rect">
             <a:avLst/>
@@ -8874,7 +8854,7 @@
             <a:pPr lvl="1"/>
             <a:r>
               <a:rPr lang="en-US" dirty="0"/>
-              <a:t>Study the average sales per week for all stores and departments throughout the years 2010-2013.</a:t>
+              <a:t>Study the average sales per week for all stores and departments provided in the dataset throughout the years 2010-2013.</a:t>
             </a:r>
           </a:p>
           <a:p>

</xml_diff>

<commit_message>
submitting V1.2 updated PPT slides
</commit_message>
<xml_diff>
--- a/Project 1 PPT Slides.pptx
+++ b/Project 1 PPT Slides.pptx
@@ -215,7 +215,7 @@
           <a:p>
             <a:fld id="{C47638AC-7313-7347-8D47-01C602CDDC6A}" type="datetimeFigureOut">
               <a:rPr lang="en-US" smtClean="0"/>
-              <a:t>4/25/20</a:t>
+              <a:t>4/27/20</a:t>
             </a:fld>
             <a:endParaRPr lang="en-US"/>
           </a:p>
@@ -2439,7 +2439,7 @@
           <a:p>
             <a:fld id="{ED291B17-9318-49DB-B28B-6E5994AE9581}" type="datetime1">
               <a:rPr lang="en-US" smtClean="0"/>
-              <a:t>4/25/20</a:t>
+              <a:t>4/27/20</a:t>
             </a:fld>
             <a:endParaRPr lang="en-US" dirty="0"/>
           </a:p>
@@ -2642,7 +2642,7 @@
           <a:p>
             <a:fld id="{2CED4963-E985-44C4-B8C4-FDD613B7C2F8}" type="datetime1">
               <a:rPr lang="en-US" smtClean="0"/>
-              <a:t>4/25/20</a:t>
+              <a:t>4/27/20</a:t>
             </a:fld>
             <a:endParaRPr lang="en-US" dirty="0"/>
           </a:p>
@@ -3004,7 +3004,7 @@
           <a:p>
             <a:fld id="{ED291B17-9318-49DB-B28B-6E5994AE9581}" type="datetime1">
               <a:rPr lang="en-US" smtClean="0"/>
-              <a:t>4/25/20</a:t>
+              <a:t>4/27/20</a:t>
             </a:fld>
             <a:endParaRPr lang="en-US" dirty="0"/>
           </a:p>
@@ -3202,7 +3202,7 @@
           <a:p>
             <a:fld id="{78DD82B9-B8EE-4375-B6FF-88FA6ABB15D9}" type="datetime1">
               <a:rPr lang="en-US" smtClean="0"/>
-              <a:t>4/25/20</a:t>
+              <a:t>4/27/20</a:t>
             </a:fld>
             <a:endParaRPr lang="en-US" dirty="0"/>
           </a:p>
@@ -3514,7 +3514,7 @@
           <a:p>
             <a:fld id="{B2497495-0637-405E-AE64-5CC7506D51F5}" type="datetime1">
               <a:rPr lang="en-US" smtClean="0"/>
-              <a:t>4/25/20</a:t>
+              <a:t>4/27/20</a:t>
             </a:fld>
             <a:endParaRPr lang="en-US" dirty="0"/>
           </a:p>
@@ -3767,7 +3767,7 @@
           <a:p>
             <a:fld id="{7BFFD690-9426-415D-8B65-26881E07B2D4}" type="datetime1">
               <a:rPr lang="en-US" smtClean="0"/>
-              <a:t>4/25/20</a:t>
+              <a:t>4/27/20</a:t>
             </a:fld>
             <a:endParaRPr lang="en-US" dirty="0"/>
           </a:p>
@@ -4189,7 +4189,7 @@
           <a:p>
             <a:fld id="{04C4989A-474C-40DE-95B9-011C28B71673}" type="datetime1">
               <a:rPr lang="en-US" smtClean="0"/>
-              <a:t>4/25/20</a:t>
+              <a:t>4/27/20</a:t>
             </a:fld>
             <a:endParaRPr lang="en-US" dirty="0"/>
           </a:p>
@@ -4312,7 +4312,7 @@
           <a:p>
             <a:fld id="{5DB4ED54-5B5E-4A04-93D3-5772E3CE3818}" type="datetime1">
               <a:rPr lang="en-US" smtClean="0"/>
-              <a:t>4/25/20</a:t>
+              <a:t>4/27/20</a:t>
             </a:fld>
             <a:endParaRPr lang="en-US" dirty="0"/>
           </a:p>
@@ -4407,7 +4407,7 @@
           <a:p>
             <a:fld id="{4EDE50D6-574B-40AF-946F-D52A04ADE379}" type="datetime1">
               <a:rPr lang="en-US" smtClean="0"/>
-              <a:t>4/25/20</a:t>
+              <a:t>4/27/20</a:t>
             </a:fld>
             <a:endParaRPr lang="en-US" dirty="0"/>
           </a:p>
@@ -4784,7 +4784,7 @@
           <a:p>
             <a:fld id="{D82884F1-FFEA-405F-9602-3DCA865EDA4E}" type="datetime1">
               <a:rPr lang="en-US" smtClean="0"/>
-              <a:t>4/25/20</a:t>
+              <a:t>4/27/20</a:t>
             </a:fld>
             <a:endParaRPr lang="en-US" dirty="0"/>
           </a:p>
@@ -5077,7 +5077,7 @@
           <a:p>
             <a:fld id="{7E18DB4A-8810-4A10-AD5C-D5E2C667F5B3}" type="datetime1">
               <a:rPr lang="en-US" smtClean="0"/>
-              <a:t>4/25/20</a:t>
+              <a:t>4/27/20</a:t>
             </a:fld>
             <a:endParaRPr lang="en-US" dirty="0"/>
           </a:p>
@@ -5292,7 +5292,7 @@
           <a:p>
             <a:fld id="{ED291B17-9318-49DB-B28B-6E5994AE9581}" type="datetime1">
               <a:rPr lang="en-US" smtClean="0"/>
-              <a:t>4/25/20</a:t>
+              <a:t>4/27/20</a:t>
             </a:fld>
             <a:endParaRPr lang="en-US" dirty="0"/>
           </a:p>
@@ -6165,12 +6165,12 @@
               </a:lnSpc>
             </a:pPr>
             <a:r>
-              <a:rPr lang="en-US" sz="2500">
+              <a:rPr lang="en-US" sz="2500" dirty="0">
                 <a:solidFill>
                   <a:schemeClr val="tx1"/>
                 </a:solidFill>
               </a:rPr>
-              <a:t>Prediction of black Friday/ cyber monday Walmart sales</a:t>
+              <a:t>Walmart HOLIDAY sales ANALYSIS</a:t>
             </a:r>
           </a:p>
         </p:txBody>

</xml_diff>

<commit_message>
submitting V1.3 updated PPT slides
</commit_message>
<xml_diff>
--- a/Project 1 PPT Slides.pptx
+++ b/Project 1 PPT Slides.pptx
@@ -7139,7 +7139,7 @@
         <p:spPr/>
         <p:txBody>
           <a:bodyPr>
-            <a:normAutofit lnSpcReduction="10000"/>
+            <a:normAutofit/>
           </a:bodyPr>
           <a:lstStyle/>
           <a:p>
@@ -7151,16 +7151,12 @@
           <a:p>
             <a:r>
               <a:rPr lang="en-US" sz="2800" dirty="0"/>
-              <a:t>Average Sales from Bottom 3 stores: 5, 33, 44</a:t>
-            </a:r>
-          </a:p>
-          <a:p>
-            <a:r>
-              <a:rPr lang="en-US" sz="2800" dirty="0"/>
-              <a:t>We were not able to correlate the store #’s from the store names, as this data was not provided.</a:t>
-            </a:r>
-          </a:p>
-          <a:p>
+              <a:t>Average Sales from Bottom 3 stores: 5, 33</a:t>
+            </a:r>
+            <a:r>
+              <a:rPr lang="en-US" sz="2800"/>
+              <a:t>, 44</a:t>
+            </a:r>
             <a:endParaRPr lang="en-US" sz="2800" dirty="0"/>
           </a:p>
         </p:txBody>

</xml_diff>

<commit_message>
submitting V1.4 updated PPT slides
</commit_message>
<xml_diff>
--- a/Project 1 PPT Slides.pptx
+++ b/Project 1 PPT Slides.pptx
@@ -1727,6 +1727,35 @@
               <a:rPr lang="en-US" dirty="0"/>
               <a:t>Tasneem</a:t>
             </a:r>
+          </a:p>
+          <a:p>
+            <a:endParaRPr lang="en-US" dirty="0"/>
+          </a:p>
+          <a:p>
+            <a:pPr marL="0" marR="0" lvl="0" indent="0" algn="l" defTabSz="914400" rtl="0" eaLnBrk="1" fontAlgn="auto" latinLnBrk="0" hangingPunct="1">
+              <a:lnSpc>
+                <a:spcPct val="100000"/>
+              </a:lnSpc>
+              <a:spcBef>
+                <a:spcPts val="0"/>
+              </a:spcBef>
+              <a:spcAft>
+                <a:spcPts val="0"/>
+              </a:spcAft>
+              <a:buClrTx/>
+              <a:buSzTx/>
+              <a:buFontTx/>
+              <a:buNone/>
+              <a:tabLst/>
+              <a:defRPr/>
+            </a:pPr>
+            <a:r>
+              <a:rPr lang="en-US" sz="1200" dirty="0"/>
+              <a:t>The date field was broken down by year, month and day</a:t>
+            </a:r>
+          </a:p>
+          <a:p>
+            <a:endParaRPr lang="en-US" dirty="0"/>
           </a:p>
         </p:txBody>
       </p:sp>
@@ -6327,7 +6356,7 @@
         </p:spPr>
         <p:txBody>
           <a:bodyPr>
-            <a:normAutofit fontScale="55000" lnSpcReduction="20000"/>
+            <a:normAutofit fontScale="77500" lnSpcReduction="20000"/>
           </a:bodyPr>
           <a:lstStyle/>
           <a:p>
@@ -6339,63 +6368,42 @@
           <a:p>
             <a:r>
               <a:rPr lang="en-US" sz="2900" dirty="0"/>
-              <a:t>Unemployment</a:t>
+              <a:t>Unemployment Rates – During Week 41 thru 51</a:t>
             </a:r>
           </a:p>
           <a:p>
             <a:pPr lvl="1"/>
             <a:r>
               <a:rPr lang="en-US" sz="2600" dirty="0"/>
-              <a:t>2010</a:t>
-            </a:r>
-          </a:p>
-          <a:p>
-            <a:pPr lvl="2"/>
+              <a:t>2010: 8.5</a:t>
+            </a:r>
+            <a:r>
+              <a:rPr lang="en-US" sz="2600" i="1" dirty="0"/>
+              <a:t>%</a:t>
+            </a:r>
+          </a:p>
+          <a:p>
+            <a:pPr lvl="1"/>
+            <a:r>
+              <a:rPr lang="en-US" sz="2800" dirty="0"/>
+              <a:t>2011: </a:t>
+            </a:r>
             <a:r>
               <a:rPr lang="en-US" sz="2600" dirty="0"/>
-              <a:t>Highest unemployment rate of 8.5</a:t>
-            </a:r>
-            <a:r>
-              <a:rPr lang="en-US" sz="2600" i="1" dirty="0"/>
-              <a:t>% </a:t>
-            </a:r>
-            <a:r>
-              <a:rPr lang="en-US" sz="2600" dirty="0"/>
-              <a:t>during Week 41 thru 51.</a:t>
+              <a:t>7.8% </a:t>
             </a:r>
           </a:p>
           <a:p>
             <a:pPr lvl="1"/>
             <a:r>
-              <a:rPr lang="en-US" sz="2600" dirty="0"/>
-              <a:t>2011</a:t>
-            </a:r>
-          </a:p>
-          <a:p>
-            <a:pPr lvl="2"/>
-            <a:r>
-              <a:rPr lang="en-US" sz="2600" dirty="0"/>
-              <a:t>Unemployment rate of 7.8% during Week 41 thru 51.</a:t>
+              <a:rPr lang="en-US" sz="2800" dirty="0"/>
+              <a:t>2012: 3.5%</a:t>
             </a:r>
           </a:p>
           <a:p>
             <a:pPr lvl="1"/>
             <a:r>
-              <a:rPr lang="en-US" sz="2600" dirty="0"/>
-              <a:t>2012</a:t>
-            </a:r>
-          </a:p>
-          <a:p>
-            <a:pPr lvl="2"/>
-            <a:r>
-              <a:rPr lang="en-US" sz="2600" dirty="0"/>
-              <a:t>Unemployment rate of 3.5% during Week 41 thru 51.</a:t>
-            </a:r>
-          </a:p>
-          <a:p>
-            <a:pPr lvl="1"/>
-            <a:r>
-              <a:rPr lang="en-US" sz="2600" dirty="0"/>
+              <a:rPr lang="en-US" sz="2800" dirty="0"/>
               <a:t>Correlation</a:t>
             </a:r>
           </a:p>
@@ -6412,17 +6420,6 @@
               <a:rPr lang="en-US" sz="2600" dirty="0"/>
               <a:t>There was no specific correlation in unemployment to the Walmart sales revenue.</a:t>
             </a:r>
-          </a:p>
-          <a:p>
-            <a:pPr lvl="2"/>
-            <a:r>
-              <a:rPr lang="en-US" sz="2600" dirty="0"/>
-              <a:t>Walmart is known as a “discount store”.  Therefore, higher unemployment rate results in higher sales for Walmart.</a:t>
-            </a:r>
-            <a:endParaRPr lang="en-US" dirty="0"/>
-          </a:p>
-          <a:p>
-            <a:pPr lvl="1"/>
             <a:endParaRPr lang="en-US" dirty="0"/>
           </a:p>
           <a:p>
@@ -6795,7 +6792,7 @@
         <p:spPr>
           <a:xfrm>
             <a:off x="895939" y="2069903"/>
-            <a:ext cx="10714870" cy="1231106"/>
+            <a:ext cx="10714870" cy="800219"/>
           </a:xfrm>
           <a:prstGeom prst="rect">
             <a:avLst/>
@@ -6831,26 +6828,6 @@
             <a:r>
               <a:rPr lang="en-US" sz="1400" dirty="0"/>
               <a:t>The R-Value between CPI and weekly sales revenue was -0.02.</a:t>
-            </a:r>
-          </a:p>
-          <a:p>
-            <a:pPr marL="800100" lvl="1" indent="-342900">
-              <a:buFont typeface="Arial" panose="020B0604020202020204" pitchFamily="34" charset="0"/>
-              <a:buChar char="•"/>
-            </a:pPr>
-            <a:r>
-              <a:rPr lang="en-US" sz="1400" dirty="0"/>
-              <a:t>CPI and weekly sales revenue are inversely proportional.</a:t>
-            </a:r>
-          </a:p>
-          <a:p>
-            <a:pPr marL="342900" indent="-342900">
-              <a:buFont typeface="Arial" panose="020B0604020202020204" pitchFamily="34" charset="0"/>
-              <a:buChar char="•"/>
-            </a:pPr>
-            <a:r>
-              <a:rPr lang="en-US" sz="1400" dirty="0"/>
-              <a:t>The CPI value during 2010 is lowest as compared to 2011 and 2012.  Therefore, sales revenue in 2010 is slightly higher than 2011 and 2012.</a:t>
             </a:r>
           </a:p>
         </p:txBody>
@@ -6979,19 +6956,13 @@
           <a:p>
             <a:r>
               <a:rPr lang="en-US" dirty="0"/>
-              <a:t>The highest average sales departments: 92, 95 and 38</a:t>
+              <a:t>Department #’s 92, 95 and 38 had the highest average sales</a:t>
             </a:r>
           </a:p>
           <a:p>
             <a:r>
               <a:rPr lang="en-US" dirty="0"/>
-              <a:t>The lowest average sales departments: 43, 47, 51</a:t>
-            </a:r>
-          </a:p>
-          <a:p>
-            <a:r>
-              <a:rPr lang="en-US" dirty="0"/>
-              <a:t>We were not able to correlate the department #’s from the department names, as this data was not provided.</a:t>
+              <a:t>Department #’s 43, 47, 51 had the lowest average sales</a:t>
             </a:r>
           </a:p>
         </p:txBody>
@@ -7020,8 +6991,8 @@
         </p:blipFill>
         <p:spPr>
           <a:xfrm>
-            <a:off x="1183512" y="3429000"/>
-            <a:ext cx="9076607" cy="2904514"/>
+            <a:off x="499487" y="3342290"/>
+            <a:ext cx="10444657" cy="3342290"/>
           </a:xfrm>
         </p:spPr>
       </p:pic>
@@ -7115,8 +7086,8 @@
         </p:blipFill>
         <p:spPr>
           <a:xfrm>
-            <a:off x="581025" y="3005296"/>
-            <a:ext cx="5194300" cy="2077720"/>
+            <a:off x="73115" y="2686015"/>
+            <a:ext cx="6183058" cy="2473223"/>
           </a:xfrm>
         </p:spPr>
       </p:pic>
@@ -7145,19 +7116,22 @@
           <a:p>
             <a:r>
               <a:rPr lang="en-US" sz="2800" dirty="0"/>
-              <a:t>Average Sales from Top 3 stores:  4, 14 and 20</a:t>
-            </a:r>
-          </a:p>
-          <a:p>
-            <a:r>
-              <a:rPr lang="en-US" sz="2800" dirty="0"/>
-              <a:t>Average Sales from Bottom 3 stores: 5, 33</a:t>
-            </a:r>
-            <a:r>
-              <a:rPr lang="en-US" sz="2800"/>
-              <a:t>, 44</a:t>
-            </a:r>
-            <a:endParaRPr lang="en-US" sz="2800" dirty="0"/>
+              <a:t>AVG Sales vs Store #</a:t>
+            </a:r>
+          </a:p>
+          <a:p>
+            <a:pPr lvl="1"/>
+            <a:r>
+              <a:rPr lang="en-US" sz="2600" dirty="0"/>
+              <a:t>Top 3 store #’s 4, 14 and 20 had the highest average sales revenue</a:t>
+            </a:r>
+          </a:p>
+          <a:p>
+            <a:pPr lvl="1"/>
+            <a:r>
+              <a:rPr lang="en-US" sz="2600" dirty="0"/>
+              <a:t>Bottom 3 store #’s 5, 33, 44 had the lowest average sales revenue</a:t>
+            </a:r>
           </a:p>
         </p:txBody>
       </p:sp>
@@ -7252,13 +7226,13 @@
           <a:p>
             <a:r>
               <a:rPr lang="en-US" sz="2400" dirty="0"/>
-              <a:t>This chart provides the maximum weekly sales per year.  </a:t>
+              <a:t>These charts provide the maximum weekly sales per year.  </a:t>
             </a:r>
           </a:p>
           <a:p>
             <a:r>
               <a:rPr lang="en-US" sz="2400" dirty="0"/>
-              <a:t>It is determined that Black Friday/Cyber Monday is the maximum sales revenue generating Holiday throughout the year.</a:t>
+              <a:t>The highest/max sales revenue was generated during Thanksgiving Holiday weekend.</a:t>
             </a:r>
           </a:p>
         </p:txBody>
@@ -7954,7 +7928,7 @@
         <p:spPr>
           <a:xfrm>
             <a:off x="1353312" y="4645152"/>
-            <a:ext cx="5858567" cy="1200329"/>
+            <a:ext cx="5858567" cy="923330"/>
           </a:xfrm>
           <a:prstGeom prst="rect">
             <a:avLst/>
@@ -7969,7 +7943,7 @@
           <a:p>
             <a:r>
               <a:rPr lang="en-US" dirty="0"/>
-              <a:t>Correlation</a:t>
+              <a:t>Walmart Weekly Sales vs Store Size</a:t>
             </a:r>
           </a:p>
           <a:p>
@@ -7979,7 +7953,7 @@
             </a:pPr>
             <a:r>
               <a:rPr lang="en-US" dirty="0"/>
-              <a:t>R-Value of weekly sales vs Walmart store size is 0.24.</a:t>
+              <a:t>R-Value is 0.24.</a:t>
             </a:r>
           </a:p>
           <a:p>
@@ -7989,7 +7963,7 @@
             </a:pPr>
             <a:r>
               <a:rPr lang="en-US" dirty="0"/>
-              <a:t>This results in insufficient data to provide a strong correlation between store size and weekly sales.</a:t>
+              <a:t>No strong correlation.</a:t>
             </a:r>
           </a:p>
         </p:txBody>
@@ -8197,7 +8171,7 @@
           <a:p>
             <a:r>
               <a:rPr lang="en-US" dirty="0"/>
-              <a:t>CONCLUSION SUMMARY</a:t>
+              <a:t>CONCLUSION</a:t>
             </a:r>
           </a:p>
         </p:txBody>
@@ -8221,84 +8195,49 @@
         <p:spPr/>
         <p:txBody>
           <a:bodyPr>
-            <a:normAutofit lnSpcReduction="10000"/>
+            <a:normAutofit/>
           </a:bodyPr>
           <a:lstStyle/>
           <a:p>
             <a:pPr lvl="1"/>
             <a:r>
               <a:rPr lang="en-US" dirty="0"/>
-              <a:t>Determine highest (max) sales revenue based on the US holidays</a:t>
-            </a:r>
-          </a:p>
-          <a:p>
-            <a:pPr lvl="2"/>
+              <a:t>MAXIMUM sales revenue occurred during Thanksgiving weekend (Black Friday/Cyber Monday), Week 47.</a:t>
+            </a:r>
+          </a:p>
+          <a:p>
+            <a:pPr lvl="1"/>
             <a:r>
               <a:rPr lang="en-US" dirty="0"/>
-              <a:t>Highest sales revenue occurred during Thanksgiving weekend (Black Friday/Cyber Monday), Week 47.</a:t>
+              <a:t>HIGHEST AVERAGE sales per week occurred during the week before Christmas, Week 51.  The second highest average occurred during Thanksgiving weekend, Week 47.</a:t>
             </a:r>
           </a:p>
           <a:p>
             <a:pPr lvl="1"/>
             <a:r>
               <a:rPr lang="en-US" dirty="0"/>
-              <a:t>Study the average sales per week for all stores and departments throughout the years 2010-2013.</a:t>
-            </a:r>
-          </a:p>
-          <a:p>
-            <a:pPr lvl="2"/>
+              <a:t>HOLIDAY does have a big impact in sales revenue.</a:t>
+            </a:r>
+          </a:p>
+          <a:p>
+            <a:pPr lvl="1"/>
             <a:r>
               <a:rPr lang="en-US" dirty="0"/>
-              <a:t>Highest average sales per week occurred during Christmas, Week 51.  The second highest average occurred during Thanksgiving weekend.</a:t>
+              <a:t>Temperature and Fuel Price are not the contributing factors.</a:t>
             </a:r>
           </a:p>
           <a:p>
             <a:pPr lvl="1"/>
             <a:r>
               <a:rPr lang="en-US" dirty="0"/>
-              <a:t>Does holiday have any impact in the # of sales revenue?</a:t>
-            </a:r>
-          </a:p>
-          <a:p>
-            <a:pPr lvl="2"/>
+              <a:t>There was slight correlation between CPI, unemployment and store size to the sales revenue.</a:t>
+            </a:r>
+          </a:p>
+          <a:p>
+            <a:pPr lvl="1"/>
             <a:r>
               <a:rPr lang="en-US" dirty="0"/>
-              <a:t>Yes, holiday does have a big impact in sales revenue.</a:t>
-            </a:r>
-          </a:p>
-          <a:p>
-            <a:pPr lvl="1"/>
-            <a:r>
-              <a:rPr lang="en-US" dirty="0"/>
-              <a:t>Contributing factors/correlation to sales revenue, such as:</a:t>
-            </a:r>
-          </a:p>
-          <a:p>
-            <a:pPr lvl="2"/>
-            <a:r>
-              <a:rPr lang="en-US" dirty="0"/>
-              <a:t>Temperature, CPI, Unemployment, Fuel Price, Holiday, Store Size</a:t>
-            </a:r>
-          </a:p>
-          <a:p>
-            <a:pPr lvl="3"/>
-            <a:r>
-              <a:rPr lang="en-US" dirty="0"/>
-              <a:t>There was no correlation in Temperature, Fuel Price</a:t>
-            </a:r>
-          </a:p>
-          <a:p>
-            <a:pPr lvl="3"/>
-            <a:r>
-              <a:rPr lang="en-US" dirty="0"/>
-              <a:t>However, we did see slight correlation between CPI, unemployment and store size to the sales revenue.</a:t>
-            </a:r>
-          </a:p>
-          <a:p>
-            <a:pPr lvl="3"/>
-            <a:r>
-              <a:rPr lang="en-US" dirty="0"/>
-              <a:t>We were not able to visualize any significant (strong) correlation between sales revenue and the aforementioned data factors.</a:t>
+              <a:t>We were not able to visualize any significant (strong) correlation between sales revenue and given data.</a:t>
             </a:r>
           </a:p>
         </p:txBody>
@@ -8979,7 +8918,7 @@
         </p:spPr>
         <p:txBody>
           <a:bodyPr>
-            <a:normAutofit lnSpcReduction="10000"/>
+            <a:normAutofit/>
           </a:bodyPr>
           <a:lstStyle/>
           <a:p>
@@ -9035,16 +8974,6 @@
               <a:rPr lang="en-US" sz="1800" dirty="0"/>
               <a:t>)</a:t>
             </a:r>
-          </a:p>
-          <a:p>
-            <a:pPr lvl="1"/>
-            <a:r>
-              <a:rPr lang="en-US" sz="1800" dirty="0"/>
-              <a:t>The date field was broken down by year, month and day</a:t>
-            </a:r>
-          </a:p>
-          <a:p>
-            <a:endParaRPr lang="en-US" dirty="0"/>
           </a:p>
         </p:txBody>
       </p:sp>
@@ -9548,7 +9477,7 @@
           <a:p>
             <a:r>
               <a:rPr lang="en-US" sz="2200" dirty="0"/>
-              <a:t>Sales Revenue</a:t>
+              <a:t>MAX WEEKLY Sales Revenue</a:t>
             </a:r>
           </a:p>
           <a:p>
@@ -9692,7 +9621,7 @@
           <a:p>
             <a:r>
               <a:rPr lang="en-US" sz="2200" dirty="0"/>
-              <a:t>Sales Revenue</a:t>
+              <a:t>AVG WEEKLY Sales Revenue</a:t>
             </a:r>
           </a:p>
           <a:p>

</xml_diff>